<commit_message>
Hackthon dec 2014 presentation
</commit_message>
<xml_diff>
--- a/Presentation1.pptx
+++ b/Presentation1.pptx
@@ -6,10 +6,11 @@
   </p:sldMasterIdLst>
   <p:sldIdLst>
     <p:sldId id="256" r:id="rId2"/>
-    <p:sldId id="257" r:id="rId3"/>
-    <p:sldId id="258" r:id="rId4"/>
-    <p:sldId id="259" r:id="rId5"/>
-    <p:sldId id="260" r:id="rId6"/>
+    <p:sldId id="261" r:id="rId3"/>
+    <p:sldId id="257" r:id="rId4"/>
+    <p:sldId id="258" r:id="rId5"/>
+    <p:sldId id="259" r:id="rId6"/>
+    <p:sldId id="260" r:id="rId7"/>
   </p:sldIdLst>
   <p:sldSz cx="9144000" cy="6858000" type="screen4x3"/>
   <p:notesSz cx="6858000" cy="9144000"/>
@@ -8525,43 +8526,62 @@
           <a:lstStyle/>
           <a:p>
             <a:r>
+              <a:rPr lang="en-US" dirty="0" smtClean="0"/>
+              <a:t>HIVE is not enough!</a:t>
+            </a:r>
+            <a:endParaRPr lang="en-US" dirty="0"/>
+          </a:p>
+        </p:txBody>
+      </p:sp>
+      <p:sp>
+        <p:nvSpPr>
+          <p:cNvPr id="3" name="Content Placeholder 2"/>
+          <p:cNvSpPr>
+            <a:spLocks noGrp="1"/>
+          </p:cNvSpPr>
+          <p:nvPr>
+            <p:ph idx="1"/>
+          </p:nvPr>
+        </p:nvSpPr>
+        <p:spPr/>
+        <p:txBody>
+          <a:bodyPr/>
+          <a:lstStyle/>
+          <a:p>
+            <a:r>
+              <a:rPr lang="en-US" dirty="0" smtClean="0"/>
+              <a:t>Find me all </a:t>
+            </a:r>
+            <a:r>
               <a:rPr lang="en-US" dirty="0" err="1" smtClean="0"/>
-              <a:t>WordCount</a:t>
+              <a:t>germans</a:t>
             </a:r>
             <a:r>
               <a:rPr lang="en-US" dirty="0" smtClean="0"/>
-              <a:t> in Scalding</a:t>
-            </a:r>
+              <a:t> jobs from our DB</a:t>
+            </a:r>
+          </a:p>
+          <a:p>
+            <a:r>
+              <a:rPr lang="en-US" dirty="0" smtClean="0"/>
+              <a:t>Evaluate how carotene distribute all the Job titles to different SOC codes</a:t>
+            </a:r>
+          </a:p>
+          <a:p>
+            <a:pPr marL="0" indent="0">
+              <a:buNone/>
+            </a:pPr>
+            <a:endParaRPr lang="en-US" dirty="0" smtClean="0"/>
+          </a:p>
+          <a:p>
             <a:endParaRPr lang="en-US" dirty="0"/>
           </a:p>
         </p:txBody>
       </p:sp>
-      <p:pic>
-        <p:nvPicPr>
-          <p:cNvPr id="4" name="Content Placeholder 3"/>
-          <p:cNvPicPr>
-            <a:picLocks noGrp="1" noChangeAspect="1"/>
-          </p:cNvPicPr>
-          <p:nvPr>
-            <p:ph idx="1"/>
-          </p:nvPr>
-        </p:nvPicPr>
-        <p:blipFill rotWithShape="1">
-          <a:blip r:embed="rId2"/>
-          <a:srcRect t="-9660" b="-26734"/>
-          <a:stretch/>
-        </p:blipFill>
-        <p:spPr>
-          <a:xfrm>
-            <a:off x="1831641" y="2457821"/>
-            <a:ext cx="4854019" cy="2662638"/>
-          </a:xfrm>
-        </p:spPr>
-      </p:pic>
     </p:spTree>
     <p:extLst>
       <p:ext uri="{BB962C8B-B14F-4D97-AF65-F5344CB8AC3E}">
-        <p14:creationId xmlns:p14="http://schemas.microsoft.com/office/powerpoint/2010/main" val="1872009575"/>
+        <p14:creationId xmlns:p14="http://schemas.microsoft.com/office/powerpoint/2010/main" val="3960638802"/>
       </p:ext>
     </p:extLst>
   </p:cSld>
@@ -8605,11 +8625,11 @@
           <a:p>
             <a:r>
               <a:rPr lang="en-US" dirty="0" err="1" smtClean="0"/>
-              <a:t>Wordcount</a:t>
+              <a:t>WordCount</a:t>
             </a:r>
             <a:r>
               <a:rPr lang="en-US" dirty="0" smtClean="0"/>
-              <a:t> project structure</a:t>
+              <a:t> in Scalding</a:t>
             </a:r>
             <a:endParaRPr lang="en-US" dirty="0"/>
           </a:p>
@@ -8617,7 +8637,7 @@
       </p:sp>
       <p:pic>
         <p:nvPicPr>
-          <p:cNvPr id="6" name="Content Placeholder 5"/>
+          <p:cNvPr id="4" name="Content Placeholder 3"/>
           <p:cNvPicPr>
             <a:picLocks noGrp="1" noChangeAspect="1"/>
           </p:cNvPicPr>
@@ -8625,19 +8645,22 @@
             <p:ph idx="1"/>
           </p:nvPr>
         </p:nvPicPr>
-        <p:blipFill>
+        <p:blipFill rotWithShape="1">
           <a:blip r:embed="rId2"/>
-          <a:srcRect l="-81474" r="-81474"/>
-          <a:stretch>
-            <a:fillRect/>
-          </a:stretch>
+          <a:srcRect t="-9660" b="-26734"/>
+          <a:stretch/>
         </p:blipFill>
-        <p:spPr/>
+        <p:spPr>
+          <a:xfrm>
+            <a:off x="1831641" y="2457821"/>
+            <a:ext cx="4854019" cy="2662638"/>
+          </a:xfrm>
+        </p:spPr>
       </p:pic>
     </p:spTree>
     <p:extLst>
       <p:ext uri="{BB962C8B-B14F-4D97-AF65-F5344CB8AC3E}">
-        <p14:creationId xmlns:p14="http://schemas.microsoft.com/office/powerpoint/2010/main" val="3029304195"/>
+        <p14:creationId xmlns:p14="http://schemas.microsoft.com/office/powerpoint/2010/main" val="1872009575"/>
       </p:ext>
     </p:extLst>
   </p:cSld>
@@ -8680,100 +8703,40 @@
           <a:lstStyle/>
           <a:p>
             <a:r>
+              <a:rPr lang="en-US" dirty="0" err="1" smtClean="0"/>
+              <a:t>Wordcount</a:t>
+            </a:r>
+            <a:r>
               <a:rPr lang="en-US" dirty="0" smtClean="0"/>
-              <a:t>Deploying the </a:t>
-            </a:r>
-            <a:r>
-              <a:rPr lang="en-US" dirty="0" err="1" smtClean="0"/>
-              <a:t>WordCount</a:t>
+              <a:t> project structure</a:t>
             </a:r>
             <a:endParaRPr lang="en-US" dirty="0"/>
           </a:p>
         </p:txBody>
       </p:sp>
-      <p:sp>
-        <p:nvSpPr>
-          <p:cNvPr id="3" name="Content Placeholder 2"/>
-          <p:cNvSpPr>
-            <a:spLocks noGrp="1"/>
-          </p:cNvSpPr>
+      <p:pic>
+        <p:nvPicPr>
+          <p:cNvPr id="6" name="Content Placeholder 5"/>
+          <p:cNvPicPr>
+            <a:picLocks noGrp="1" noChangeAspect="1"/>
+          </p:cNvPicPr>
           <p:nvPr>
             <p:ph idx="1"/>
           </p:nvPr>
-        </p:nvSpPr>
+        </p:nvPicPr>
+        <p:blipFill>
+          <a:blip r:embed="rId2"/>
+          <a:srcRect l="-81474" r="-81474"/>
+          <a:stretch>
+            <a:fillRect/>
+          </a:stretch>
+        </p:blipFill>
         <p:spPr/>
-        <p:txBody>
-          <a:bodyPr/>
-          <a:lstStyle/>
-          <a:p>
-            <a:r>
-              <a:rPr lang="en-US" dirty="0" smtClean="0"/>
-              <a:t>Create the </a:t>
-            </a:r>
-            <a:r>
-              <a:rPr lang="en-US" dirty="0" err="1" smtClean="0"/>
-              <a:t>fatjar</a:t>
-            </a:r>
-            <a:r>
-              <a:rPr lang="en-US" dirty="0" smtClean="0"/>
-              <a:t> (~ 80 jar files has to be merged)</a:t>
-            </a:r>
-          </a:p>
-          <a:p>
-            <a:pPr lvl="1"/>
-            <a:r>
-              <a:rPr lang="en-US" dirty="0" smtClean="0"/>
-              <a:t>Using different merging strategies (e.g., rename, remove)</a:t>
-            </a:r>
-          </a:p>
-          <a:p>
-            <a:pPr lvl="1"/>
-            <a:r>
-              <a:rPr lang="en-US" dirty="0" smtClean="0"/>
-              <a:t>Exclude conflicting jars</a:t>
-            </a:r>
-          </a:p>
-          <a:p>
-            <a:r>
-              <a:rPr lang="en-US" dirty="0" smtClean="0"/>
-              <a:t>Upload the jar to CB </a:t>
-            </a:r>
-            <a:r>
-              <a:rPr lang="en-US" dirty="0" err="1" smtClean="0"/>
-              <a:t>Hadoop</a:t>
-            </a:r>
-            <a:r>
-              <a:rPr lang="en-US" dirty="0" smtClean="0"/>
-              <a:t> cluster</a:t>
-            </a:r>
-          </a:p>
-          <a:p>
-            <a:r>
-              <a:rPr lang="en-US" dirty="0" smtClean="0"/>
-              <a:t>Upload script files to CB </a:t>
-            </a:r>
-            <a:r>
-              <a:rPr lang="en-US" dirty="0" err="1" smtClean="0"/>
-              <a:t>Hadoop</a:t>
-            </a:r>
-            <a:r>
-              <a:rPr lang="en-US" dirty="0" smtClean="0"/>
-              <a:t> cluster</a:t>
-            </a:r>
-          </a:p>
-          <a:p>
-            <a:r>
-              <a:rPr lang="en-US" dirty="0" smtClean="0"/>
-              <a:t>Submit the job.</a:t>
-            </a:r>
-            <a:endParaRPr lang="en-US" dirty="0"/>
-          </a:p>
-        </p:txBody>
-      </p:sp>
+      </p:pic>
     </p:spTree>
     <p:extLst>
       <p:ext uri="{BB962C8B-B14F-4D97-AF65-F5344CB8AC3E}">
-        <p14:creationId xmlns:p14="http://schemas.microsoft.com/office/powerpoint/2010/main" val="1330054702"/>
+        <p14:creationId xmlns:p14="http://schemas.microsoft.com/office/powerpoint/2010/main" val="3029304195"/>
       </p:ext>
     </p:extLst>
   </p:cSld>
@@ -8817,6 +8780,142 @@
           <a:p>
             <a:r>
               <a:rPr lang="en-US" dirty="0" smtClean="0"/>
+              <a:t>Deploying the </a:t>
+            </a:r>
+            <a:r>
+              <a:rPr lang="en-US" dirty="0" err="1" smtClean="0"/>
+              <a:t>WordCount</a:t>
+            </a:r>
+            <a:endParaRPr lang="en-US" dirty="0"/>
+          </a:p>
+        </p:txBody>
+      </p:sp>
+      <p:sp>
+        <p:nvSpPr>
+          <p:cNvPr id="3" name="Content Placeholder 2"/>
+          <p:cNvSpPr>
+            <a:spLocks noGrp="1"/>
+          </p:cNvSpPr>
+          <p:nvPr>
+            <p:ph idx="1"/>
+          </p:nvPr>
+        </p:nvSpPr>
+        <p:spPr/>
+        <p:txBody>
+          <a:bodyPr/>
+          <a:lstStyle/>
+          <a:p>
+            <a:r>
+              <a:rPr lang="en-US" dirty="0" smtClean="0"/>
+              <a:t>Create the </a:t>
+            </a:r>
+            <a:r>
+              <a:rPr lang="en-US" dirty="0" err="1" smtClean="0"/>
+              <a:t>fatjar</a:t>
+            </a:r>
+            <a:r>
+              <a:rPr lang="en-US" dirty="0" smtClean="0"/>
+              <a:t> (~ 80 jar files has to be merged)</a:t>
+            </a:r>
+          </a:p>
+          <a:p>
+            <a:pPr lvl="1"/>
+            <a:r>
+              <a:rPr lang="en-US" dirty="0" smtClean="0"/>
+              <a:t>Using different merging strategies (e.g., rename, remove)</a:t>
+            </a:r>
+          </a:p>
+          <a:p>
+            <a:pPr lvl="1"/>
+            <a:r>
+              <a:rPr lang="en-US" dirty="0" smtClean="0"/>
+              <a:t>Exclude conflicting jars</a:t>
+            </a:r>
+          </a:p>
+          <a:p>
+            <a:r>
+              <a:rPr lang="en-US" dirty="0" smtClean="0"/>
+              <a:t>Upload the jar to CB </a:t>
+            </a:r>
+            <a:r>
+              <a:rPr lang="en-US" dirty="0" err="1" smtClean="0"/>
+              <a:t>Hadoop</a:t>
+            </a:r>
+            <a:r>
+              <a:rPr lang="en-US" dirty="0" smtClean="0"/>
+              <a:t> cluster</a:t>
+            </a:r>
+          </a:p>
+          <a:p>
+            <a:r>
+              <a:rPr lang="en-US" dirty="0" smtClean="0"/>
+              <a:t>Upload script files to CB </a:t>
+            </a:r>
+            <a:r>
+              <a:rPr lang="en-US" dirty="0" err="1" smtClean="0"/>
+              <a:t>Hadoop</a:t>
+            </a:r>
+            <a:r>
+              <a:rPr lang="en-US" dirty="0" smtClean="0"/>
+              <a:t> cluster</a:t>
+            </a:r>
+          </a:p>
+          <a:p>
+            <a:r>
+              <a:rPr lang="en-US" dirty="0" smtClean="0"/>
+              <a:t>Submit the job.</a:t>
+            </a:r>
+            <a:endParaRPr lang="en-US" dirty="0"/>
+          </a:p>
+        </p:txBody>
+      </p:sp>
+    </p:spTree>
+    <p:extLst>
+      <p:ext uri="{BB962C8B-B14F-4D97-AF65-F5344CB8AC3E}">
+        <p14:creationId xmlns:p14="http://schemas.microsoft.com/office/powerpoint/2010/main" val="1330054702"/>
+      </p:ext>
+    </p:extLst>
+  </p:cSld>
+  <p:clrMapOvr>
+    <a:masterClrMapping/>
+  </p:clrMapOvr>
+</p:sld>
+</file>
+
+<file path=ppt/slides/slide6.xml><?xml version="1.0" encoding="utf-8"?>
+<p:sld xmlns:a="http://schemas.openxmlformats.org/drawingml/2006/main" xmlns:r="http://schemas.openxmlformats.org/officeDocument/2006/relationships" xmlns:p="http://schemas.openxmlformats.org/presentationml/2006/main">
+  <p:cSld>
+    <p:spTree>
+      <p:nvGrpSpPr>
+        <p:cNvPr id="1" name=""/>
+        <p:cNvGrpSpPr/>
+        <p:nvPr/>
+      </p:nvGrpSpPr>
+      <p:grpSpPr>
+        <a:xfrm>
+          <a:off x="0" y="0"/>
+          <a:ext cx="0" cy="0"/>
+          <a:chOff x="0" y="0"/>
+          <a:chExt cx="0" cy="0"/>
+        </a:xfrm>
+      </p:grpSpPr>
+      <p:sp>
+        <p:nvSpPr>
+          <p:cNvPr id="2" name="Title 1"/>
+          <p:cNvSpPr>
+            <a:spLocks noGrp="1"/>
+          </p:cNvSpPr>
+          <p:nvPr>
+            <p:ph type="title"/>
+          </p:nvPr>
+        </p:nvSpPr>
+        <p:spPr/>
+        <p:txBody>
+          <a:bodyPr/>
+          <a:lstStyle/>
+          <a:p>
+            <a:r>
+              <a:rPr lang="en-US" dirty="0" smtClean="0"/>
               <a:t>What I want to do	</a:t>
             </a:r>
             <a:endParaRPr lang="en-US" dirty="0"/>
@@ -8861,10 +8960,9 @@
               <a:t>WebScalding</a:t>
             </a:r>
             <a:r>
-              <a:rPr lang="en-US" smtClean="0"/>
+              <a:rPr lang="en-US" dirty="0" smtClean="0"/>
               <a:t> Job</a:t>
             </a:r>
-            <a:endParaRPr lang="en-US" dirty="0" smtClean="0"/>
           </a:p>
           <a:p>
             <a:r>

</xml_diff>